<commit_message>
atp synthase collabs, presentations, etc
</commit_message>
<xml_diff>
--- a/miscellaneous/presentations/20200819_buildacell.pptx
+++ b/miscellaneous/presentations/20200819_buildacell.pptx
@@ -3354,7 +3354,7 @@
           <a:p>
             <a:fld id="{15807AF6-FE89-B241-BD21-E9B2C3AA3938}" type="datetimeFigureOut">
               <a:rPr lang="en-US" smtClean="0"/>
-              <a:t>8/20/20</a:t>
+              <a:t>8/21/20</a:t>
             </a:fld>
             <a:endParaRPr lang="en-US"/>
           </a:p>
@@ -3665,7 +3665,10 @@
           <a:bodyPr/>
           <a:lstStyle/>
           <a:p>
-            <a:endParaRPr lang="en-US" dirty="0"/>
+            <a:r>
+              <a:rPr lang="en-US" dirty="0"/>
+              <a:t>Hi I’m Ankita! Undergraduate at Caltech. I’ve been working on modelling of mechanisms for ATP life extension in synthetic cells this summer with Richard Murray Lab. I’m here to learn and contribute in any way I can</a:t>
+            </a:r>
           </a:p>
         </p:txBody>
       </p:sp>

</xml_diff>